<commit_message>
planning has been added to the presentation
</commit_message>
<xml_diff>
--- a/Pentetris bots.pptx
+++ b/Pentetris bots.pptx
@@ -12,7 +12,8 @@
     <p:sldId id="259" r:id="rId6"/>
     <p:sldId id="261" r:id="rId7"/>
     <p:sldId id="262" r:id="rId8"/>
-    <p:sldId id="263" r:id="rId9"/>
+    <p:sldId id="264" r:id="rId9"/>
+    <p:sldId id="263" r:id="rId10"/>
   </p:sldIdLst>
   <p:sldSz cx="12192000" cy="6858000"/>
   <p:notesSz cx="6858000" cy="9144000"/>
@@ -4516,6 +4517,117 @@
           <p:cNvPr id="2" name="Title 1">
             <a:extLst>
               <a:ext uri="{FF2B5EF4-FFF2-40B4-BE49-F238E27FC236}">
+                <a16:creationId xmlns:a16="http://schemas.microsoft.com/office/drawing/2014/main" id="{24A1E10B-FF1F-40B6-906B-D1F43758CB27}"/>
+              </a:ext>
+            </a:extLst>
+          </p:cNvPr>
+          <p:cNvSpPr>
+            <a:spLocks noGrp="1"/>
+          </p:cNvSpPr>
+          <p:nvPr>
+            <p:ph type="title"/>
+          </p:nvPr>
+        </p:nvSpPr>
+        <p:spPr/>
+        <p:txBody>
+          <a:bodyPr/>
+          <a:lstStyle/>
+          <a:p>
+            <a:r>
+              <a:rPr lang="en-US" dirty="0"/>
+              <a:t>Planning phase 3</a:t>
+            </a:r>
+          </a:p>
+        </p:txBody>
+      </p:sp>
+      <p:sp>
+        <p:nvSpPr>
+          <p:cNvPr id="3" name="Content Placeholder 2">
+            <a:extLst>
+              <a:ext uri="{FF2B5EF4-FFF2-40B4-BE49-F238E27FC236}">
+                <a16:creationId xmlns:a16="http://schemas.microsoft.com/office/drawing/2014/main" id="{9053D02F-A9EE-493F-93D0-6DB9305321EE}"/>
+              </a:ext>
+            </a:extLst>
+          </p:cNvPr>
+          <p:cNvSpPr>
+            <a:spLocks noGrp="1"/>
+          </p:cNvSpPr>
+          <p:nvPr>
+            <p:ph idx="1"/>
+          </p:nvPr>
+        </p:nvSpPr>
+        <p:spPr/>
+        <p:txBody>
+          <a:bodyPr/>
+          <a:lstStyle/>
+          <a:p>
+            <a:r>
+              <a:rPr lang="en-GB" dirty="0"/>
+              <a:t>Visualization: week 1 and 2</a:t>
+            </a:r>
+          </a:p>
+          <a:p>
+            <a:r>
+              <a:rPr lang="en-GB" dirty="0"/>
+              <a:t>Research: week 1</a:t>
+            </a:r>
+          </a:p>
+          <a:p>
+            <a:r>
+              <a:rPr lang="en-GB" dirty="0"/>
+              <a:t>Implementation: end of week 1, start of week 2 and polish in week 3</a:t>
+            </a:r>
+          </a:p>
+          <a:p>
+            <a:r>
+              <a:rPr lang="en-GB" dirty="0"/>
+              <a:t>Report: introduction, format, etc week 1, finish in week 3</a:t>
+            </a:r>
+          </a:p>
+          <a:p>
+            <a:r>
+              <a:rPr lang="en-GB"/>
+              <a:t>Presentation: week 3</a:t>
+            </a:r>
+            <a:endParaRPr lang="en-US" dirty="0"/>
+          </a:p>
+        </p:txBody>
+      </p:sp>
+    </p:spTree>
+    <p:extLst>
+      <p:ext uri="{BB962C8B-B14F-4D97-AF65-F5344CB8AC3E}">
+        <p14:creationId xmlns:p14="http://schemas.microsoft.com/office/powerpoint/2010/main" val="3349127307"/>
+      </p:ext>
+    </p:extLst>
+  </p:cSld>
+  <p:clrMapOvr>
+    <a:masterClrMapping/>
+  </p:clrMapOvr>
+</p:sld>
+</file>
+
+<file path=ppt/slides/slide9.xml><?xml version="1.0" encoding="utf-8"?>
+<p:sld xmlns:a="http://schemas.openxmlformats.org/drawingml/2006/main" xmlns:r="http://schemas.openxmlformats.org/officeDocument/2006/relationships" xmlns:p="http://schemas.openxmlformats.org/presentationml/2006/main">
+  <p:cSld>
+    <p:spTree>
+      <p:nvGrpSpPr>
+        <p:cNvPr id="1" name=""/>
+        <p:cNvGrpSpPr/>
+        <p:nvPr/>
+      </p:nvGrpSpPr>
+      <p:grpSpPr>
+        <a:xfrm>
+          <a:off x="0" y="0"/>
+          <a:ext cx="0" cy="0"/>
+          <a:chOff x="0" y="0"/>
+          <a:chExt cx="0" cy="0"/>
+        </a:xfrm>
+      </p:grpSpPr>
+      <p:sp>
+        <p:nvSpPr>
+          <p:cNvPr id="2" name="Title 1">
+            <a:extLst>
+              <a:ext uri="{FF2B5EF4-FFF2-40B4-BE49-F238E27FC236}">
                 <a16:creationId xmlns:a16="http://schemas.microsoft.com/office/drawing/2014/main" id="{4682BDC7-14CF-4BA5-A19D-D66FEE3E7C47}"/>
               </a:ext>
             </a:extLst>

</xml_diff>

<commit_message>
Small presentation improvements and added video
</commit_message>
<xml_diff>
--- a/Pentetris bots.pptx
+++ b/Pentetris bots.pptx
@@ -132,7 +132,7 @@
 <file path=ppt/charts/chart1.xml><?xml version="1.0" encoding="utf-8"?>
 <c:chartSpace xmlns:c="http://schemas.openxmlformats.org/drawingml/2006/chart" xmlns:a="http://schemas.openxmlformats.org/drawingml/2006/main" xmlns:r="http://schemas.openxmlformats.org/officeDocument/2006/relationships" xmlns:c16r2="http://schemas.microsoft.com/office/drawing/2015/06/chart">
   <c:date1904 val="0"/>
-  <c:lang val="en-GB"/>
+  <c:lang val="en-US"/>
   <c:roundedCorners val="0"/>
   <mc:AlternateContent xmlns:mc="http://schemas.openxmlformats.org/markup-compatibility/2006">
     <mc:Choice xmlns:c14="http://schemas.microsoft.com/office/drawing/2007/8/2/chart" Requires="c14">
@@ -1099,7 +1099,7 @@
 <file path=ppt/charts/chart2.xml><?xml version="1.0" encoding="utf-8"?>
 <c:chartSpace xmlns:c="http://schemas.openxmlformats.org/drawingml/2006/chart" xmlns:a="http://schemas.openxmlformats.org/drawingml/2006/main" xmlns:r="http://schemas.openxmlformats.org/officeDocument/2006/relationships" xmlns:c16r2="http://schemas.microsoft.com/office/drawing/2015/06/chart">
   <c:date1904 val="0"/>
-  <c:lang val="en-GB"/>
+  <c:lang val="en-US"/>
   <c:roundedCorners val="0"/>
   <mc:AlternateContent xmlns:mc="http://schemas.openxmlformats.org/markup-compatibility/2006">
     <mc:Choice xmlns:c14="http://schemas.microsoft.com/office/drawing/2007/8/2/chart" Requires="c14">
@@ -2060,7 +2060,7 @@
 <file path=ppt/charts/chart3.xml><?xml version="1.0" encoding="utf-8"?>
 <c:chartSpace xmlns:c="http://schemas.openxmlformats.org/drawingml/2006/chart" xmlns:a="http://schemas.openxmlformats.org/drawingml/2006/main" xmlns:r="http://schemas.openxmlformats.org/officeDocument/2006/relationships" xmlns:c16r2="http://schemas.microsoft.com/office/drawing/2015/06/chart">
   <c:date1904 val="0"/>
-  <c:lang val="en-GB"/>
+  <c:lang val="en-US"/>
   <c:roundedCorners val="0"/>
   <mc:AlternateContent xmlns:mc="http://schemas.openxmlformats.org/markup-compatibility/2006">
     <mc:Choice xmlns:c14="http://schemas.microsoft.com/office/drawing/2007/8/2/chart" Requires="c14">
@@ -3022,7 +3022,7 @@
 <file path=ppt/charts/chart4.xml><?xml version="1.0" encoding="utf-8"?>
 <c:chartSpace xmlns:c="http://schemas.openxmlformats.org/drawingml/2006/chart" xmlns:a="http://schemas.openxmlformats.org/drawingml/2006/main" xmlns:r="http://schemas.openxmlformats.org/officeDocument/2006/relationships" xmlns:c16r2="http://schemas.microsoft.com/office/drawing/2015/06/chart">
   <c:date1904 val="0"/>
-  <c:lang val="en-GB"/>
+  <c:lang val="en-US"/>
   <c:roundedCorners val="0"/>
   <mc:AlternateContent xmlns:mc="http://schemas.openxmlformats.org/markup-compatibility/2006">
     <mc:Choice xmlns:c14="http://schemas.microsoft.com/office/drawing/2007/8/2/chart" Requires="c14">
@@ -3984,7 +3984,7 @@
 <file path=ppt/charts/chart5.xml><?xml version="1.0" encoding="utf-8"?>
 <c:chartSpace xmlns:c="http://schemas.openxmlformats.org/drawingml/2006/chart" xmlns:a="http://schemas.openxmlformats.org/drawingml/2006/main" xmlns:r="http://schemas.openxmlformats.org/officeDocument/2006/relationships" xmlns:c16r2="http://schemas.microsoft.com/office/drawing/2015/06/chart">
   <c:date1904 val="0"/>
-  <c:lang val="en-GB"/>
+  <c:lang val="en-US"/>
   <c:roundedCorners val="0"/>
   <mc:AlternateContent xmlns:mc="http://schemas.openxmlformats.org/markup-compatibility/2006">
     <mc:Choice xmlns:c14="http://schemas.microsoft.com/office/drawing/2007/8/2/chart" Requires="c14">
@@ -7801,7 +7801,7 @@
           <a:p>
             <a:fld id="{22A718B8-5F9A-4008-86CD-16CAD8395C61}" type="datetimeFigureOut">
               <a:rPr lang="en-US" smtClean="0"/>
-              <a:t>12/10/19</a:t>
+              <a:t>12/12/2019</a:t>
             </a:fld>
             <a:endParaRPr lang="en-US"/>
           </a:p>
@@ -9067,6 +9067,15 @@
           <a:p>
             <a:r>
               <a:rPr lang="en-US" dirty="0"/>
+              <a:t>We didn’t fully finish it since we switched our focus over to the other bot, but we were close to completing it</a:t>
+            </a:r>
+          </a:p>
+          <a:p>
+            <a:endParaRPr lang="en-US" dirty="0"/>
+          </a:p>
+          <a:p>
+            <a:r>
+              <a:rPr lang="en-US" dirty="0"/>
               <a:t>RENÉ</a:t>
             </a:r>
           </a:p>
@@ -9661,7 +9670,7 @@
           <a:p>
             <a:fld id="{32FC8DA1-6707-49A3-ADA2-8E23F5184E6C}" type="datetimeFigureOut">
               <a:rPr lang="en-US" smtClean="0"/>
-              <a:t>12/10/19</a:t>
+              <a:t>12/12/2019</a:t>
             </a:fld>
             <a:endParaRPr lang="en-US"/>
           </a:p>
@@ -9882,7 +9891,7 @@
           <a:p>
             <a:fld id="{32FC8DA1-6707-49A3-ADA2-8E23F5184E6C}" type="datetimeFigureOut">
               <a:rPr lang="en-US" smtClean="0"/>
-              <a:t>12/10/19</a:t>
+              <a:t>12/12/2019</a:t>
             </a:fld>
             <a:endParaRPr lang="en-US"/>
           </a:p>
@@ -10062,7 +10071,7 @@
           <a:p>
             <a:fld id="{32FC8DA1-6707-49A3-ADA2-8E23F5184E6C}" type="datetimeFigureOut">
               <a:rPr lang="en-US" smtClean="0"/>
-              <a:t>12/10/19</a:t>
+              <a:t>12/12/2019</a:t>
             </a:fld>
             <a:endParaRPr lang="en-US"/>
           </a:p>
@@ -10232,7 +10241,7 @@
           <a:p>
             <a:fld id="{32FC8DA1-6707-49A3-ADA2-8E23F5184E6C}" type="datetimeFigureOut">
               <a:rPr lang="en-US" smtClean="0"/>
-              <a:t>12/10/19</a:t>
+              <a:t>12/12/2019</a:t>
             </a:fld>
             <a:endParaRPr lang="en-US"/>
           </a:p>
@@ -10483,7 +10492,7 @@
           <a:p>
             <a:fld id="{32FC8DA1-6707-49A3-ADA2-8E23F5184E6C}" type="datetimeFigureOut">
               <a:rPr lang="en-US" smtClean="0"/>
-              <a:t>12/10/19</a:t>
+              <a:t>12/12/2019</a:t>
             </a:fld>
             <a:endParaRPr lang="en-US"/>
           </a:p>
@@ -10806,7 +10815,7 @@
           <a:p>
             <a:fld id="{32FC8DA1-6707-49A3-ADA2-8E23F5184E6C}" type="datetimeFigureOut">
               <a:rPr lang="en-US" smtClean="0"/>
-              <a:t>12/10/19</a:t>
+              <a:t>12/12/2019</a:t>
             </a:fld>
             <a:endParaRPr lang="en-US"/>
           </a:p>
@@ -11230,7 +11239,7 @@
           <a:p>
             <a:fld id="{32FC8DA1-6707-49A3-ADA2-8E23F5184E6C}" type="datetimeFigureOut">
               <a:rPr lang="en-US" smtClean="0"/>
-              <a:t>12/10/19</a:t>
+              <a:t>12/12/2019</a:t>
             </a:fld>
             <a:endParaRPr lang="en-US"/>
           </a:p>
@@ -11348,7 +11357,7 @@
           <a:p>
             <a:fld id="{32FC8DA1-6707-49A3-ADA2-8E23F5184E6C}" type="datetimeFigureOut">
               <a:rPr lang="en-US" smtClean="0"/>
-              <a:t>12/10/19</a:t>
+              <a:t>12/12/2019</a:t>
             </a:fld>
             <a:endParaRPr lang="en-US"/>
           </a:p>
@@ -11443,7 +11452,7 @@
           <a:p>
             <a:fld id="{32FC8DA1-6707-49A3-ADA2-8E23F5184E6C}" type="datetimeFigureOut">
               <a:rPr lang="en-US" smtClean="0"/>
-              <a:t>12/10/19</a:t>
+              <a:t>12/12/2019</a:t>
             </a:fld>
             <a:endParaRPr lang="en-US"/>
           </a:p>
@@ -11733,7 +11742,7 @@
           <a:p>
             <a:fld id="{32FC8DA1-6707-49A3-ADA2-8E23F5184E6C}" type="datetimeFigureOut">
               <a:rPr lang="en-US" smtClean="0"/>
-              <a:t>12/10/19</a:t>
+              <a:t>12/12/2019</a:t>
             </a:fld>
             <a:endParaRPr lang="en-US"/>
           </a:p>
@@ -12005,7 +12014,7 @@
           <a:p>
             <a:fld id="{32FC8DA1-6707-49A3-ADA2-8E23F5184E6C}" type="datetimeFigureOut">
               <a:rPr lang="en-US" smtClean="0"/>
-              <a:t>12/10/19</a:t>
+              <a:t>12/12/2019</a:t>
             </a:fld>
             <a:endParaRPr lang="en-US"/>
           </a:p>
@@ -12259,7 +12268,7 @@
           <a:p>
             <a:fld id="{32FC8DA1-6707-49A3-ADA2-8E23F5184E6C}" type="datetimeFigureOut">
               <a:rPr lang="en-US" smtClean="0"/>
-              <a:t>12/10/19</a:t>
+              <a:t>12/12/2019</a:t>
             </a:fld>
             <a:endParaRPr lang="en-US"/>
           </a:p>
@@ -14885,14 +14894,14 @@
           <p:nvPr>
             <p:extLst>
               <p:ext uri="{D42A27DB-BD31-4B8C-83A1-F6EECF244321}">
-                <p14:modId xmlns:p14="http://schemas.microsoft.com/office/powerpoint/2010/main" val="2931137269"/>
+                <p14:modId xmlns:p14="http://schemas.microsoft.com/office/powerpoint/2010/main" val="2384540574"/>
               </p:ext>
             </p:extLst>
           </p:nvPr>
         </p:nvGraphicFramePr>
         <p:xfrm>
-          <a:off x="1284158" y="741172"/>
-          <a:ext cx="9623686" cy="3279648"/>
+          <a:off x="1260389" y="741172"/>
+          <a:ext cx="9647455" cy="3588788"/>
         </p:xfrm>
         <a:graphic>
           <a:graphicData uri="http://schemas.openxmlformats.org/drawingml/2006/table">
@@ -14901,7 +14910,7 @@
                 <a:tableStyleId>{5C22544A-7EE6-4342-B048-85BDC9FD1C3A}</a:tableStyleId>
               </a:tblPr>
               <a:tblGrid>
-                <a:gridCol w="4521294">
+                <a:gridCol w="4545063">
                   <a:extLst>
                     <a:ext uri="{9D8B030D-6E8A-4147-A177-3AD203B41FA5}">
                       <a16:colId xmlns:a16="http://schemas.microsoft.com/office/drawing/2014/main" val="4241638655"/>
@@ -14940,7 +14949,7 @@
                     <a:lstStyle/>
                     <a:p>
                       <a:r>
-                        <a:rPr lang="en-US" sz="2400"/>
+                        <a:rPr lang="en-US" sz="2400" dirty="0"/>
                         <a:t>Q-bot</a:t>
                       </a:r>
                     </a:p>
@@ -14986,8 +14995,8 @@
                     <a:lstStyle/>
                     <a:p>
                       <a:r>
-                        <a:rPr lang="en-US" sz="2400"/>
-                        <a:t>Unknown</a:t>
+                        <a:rPr lang="en-US" sz="2400" dirty="0"/>
+                        <a:t>High</a:t>
                       </a:r>
                     </a:p>
                   </a:txBody>
@@ -15032,8 +15041,8 @@
                     <a:lstStyle/>
                     <a:p>
                       <a:r>
-                        <a:rPr lang="en-US" sz="2400"/>
-                        <a:t>Unknown</a:t>
+                        <a:rPr lang="en-US" sz="2400" dirty="0"/>
+                        <a:t>High</a:t>
                       </a:r>
                     </a:p>
                   </a:txBody>
@@ -15111,8 +15120,8 @@
                     <a:lstStyle/>
                     <a:p>
                       <a:r>
-                        <a:rPr lang="en-US" sz="2400"/>
-                        <a:t>Required processing power</a:t>
+                        <a:rPr lang="en-US" sz="2400" dirty="0"/>
+                        <a:t>Required processing power during play</a:t>
                       </a:r>
                     </a:p>
                   </a:txBody>
@@ -15157,7 +15166,7 @@
                     <a:lstStyle/>
                     <a:p>
                       <a:r>
-                        <a:rPr lang="en-US" sz="2400"/>
+                        <a:rPr lang="en-US" sz="2400" dirty="0"/>
                         <a:t>‘Cleverness’</a:t>
                       </a:r>
                     </a:p>
@@ -15184,7 +15193,7 @@
                     <a:p>
                       <a:r>
                         <a:rPr lang="en-US" sz="2400" dirty="0"/>
-                        <a:t>High</a:t>
+                        <a:t>Medium</a:t>
                       </a:r>
                     </a:p>
                   </a:txBody>
@@ -15361,7 +15370,7 @@
           <a:lstStyle/>
           <a:p>
             <a:r>
-              <a:rPr lang="en-US">
+              <a:rPr lang="en-US" dirty="0">
                 <a:solidFill>
                   <a:schemeClr val="bg1"/>
                 </a:solidFill>
@@ -15400,7 +15409,7 @@
           <a:lstStyle/>
           <a:p>
             <a:r>
-              <a:rPr lang="en-US">
+              <a:rPr lang="en-US" dirty="0">
                 <a:solidFill>
                   <a:schemeClr val="bg1"/>
                 </a:solidFill>
@@ -15410,7 +15419,7 @@
           </a:p>
           <a:p>
             <a:r>
-              <a:rPr lang="en-US">
+              <a:rPr lang="en-US" dirty="0">
                 <a:solidFill>
                   <a:schemeClr val="bg1"/>
                 </a:solidFill>
@@ -16219,44 +16228,70 @@
               <a:t>Results</a:t>
             </a:r>
           </a:p>
+          <a:p>
+            <a:pPr lvl="1"/>
+            <a:r>
+              <a:rPr lang="pl-PL" dirty="0">
+                <a:solidFill>
+                  <a:schemeClr val="tx1"/>
+                </a:solidFill>
+              </a:rPr>
+              <a:t>Y T V L N I W Z F X U P</a:t>
+            </a:r>
+            <a:endParaRPr lang="en-US" dirty="0">
+              <a:solidFill>
+                <a:schemeClr val="tx1"/>
+              </a:solidFill>
+            </a:endParaRPr>
+          </a:p>
         </p:txBody>
       </p:sp>
       <p:pic>
         <p:nvPicPr>
-          <p:cNvPr id="5" name="Picture 4" descr="A picture containing object, clock&#10;&#10;Description automatically generated">
+          <p:cNvPr id="7" name="WhatsApp Video 2019-12-08 at 3.39.17 PM">
+            <a:hlinkClick r:id="" action="ppaction://media"/>
             <a:extLst>
               <a:ext uri="{FF2B5EF4-FFF2-40B4-BE49-F238E27FC236}">
-                <a16:creationId xmlns:a16="http://schemas.microsoft.com/office/drawing/2014/main" id="{0B3EE4C3-D4E2-477B-9A53-7EDAC1E6DA4A}"/>
+                <a16:creationId xmlns:a16="http://schemas.microsoft.com/office/drawing/2014/main" id="{4BA71562-F4DA-4B76-B8F8-10097BACC3FC}"/>
               </a:ext>
             </a:extLst>
           </p:cNvPr>
           <p:cNvPicPr>
             <a:picLocks noChangeAspect="1"/>
           </p:cNvPicPr>
-          <p:nvPr/>
+          <p:nvPr>
+            <a:videoFile r:link="rId2"/>
+            <p:extLst>
+              <p:ext uri="{DAA4B4D4-6D71-4841-9C94-3DE7FCFB9230}">
+                <p14:media xmlns:p14="http://schemas.microsoft.com/office/powerpoint/2010/main" r:embed="rId1"/>
+              </p:ext>
+            </p:extLst>
+          </p:nvPr>
         </p:nvPicPr>
-        <p:blipFill rotWithShape="1">
-          <a:blip r:embed="rId3">
-            <a:extLst>
-              <a:ext uri="{28A0092B-C50C-407E-A947-70E740481C1C}">
-                <a14:useLocalDpi xmlns:a14="http://schemas.microsoft.com/office/drawing/2010/main" val="0"/>
-              </a:ext>
-              <a:ext uri="{837473B0-CC2E-450A-ABE3-18F120FF3D39}">
-                <a1611:picAttrSrcUrl xmlns:a1611="http://schemas.microsoft.com/office/drawing/2016/11/main" r:id="rId4"/>
-              </a:ext>
-            </a:extLst>
-          </a:blip>
-          <a:srcRect t="12555" r="-1" b="-1"/>
-          <a:stretch/>
+        <p:blipFill>
+          <a:blip r:embed="rId5"/>
+          <a:stretch>
+            <a:fillRect/>
+          </a:stretch>
         </p:blipFill>
         <p:spPr>
           <a:xfrm>
-            <a:off x="8310622" y="243840"/>
-            <a:ext cx="3646837" cy="6377939"/>
+            <a:off x="7191169" y="298123"/>
+            <a:ext cx="4696315" cy="6261753"/>
           </a:xfrm>
           <a:prstGeom prst="rect">
             <a:avLst/>
           </a:prstGeom>
+          <a:ln>
+            <a:noFill/>
+          </a:ln>
+          <a:effectLst>
+            <a:outerShdw blurRad="190500" algn="tl" rotWithShape="0">
+              <a:srgbClr val="000000">
+                <a:alpha val="70000"/>
+              </a:srgbClr>
+            </a:outerShdw>
+          </a:effectLst>
         </p:spPr>
       </p:pic>
     </p:spTree>
@@ -16269,6 +16304,144 @@
   <p:clrMapOvr>
     <a:masterClrMapping/>
   </p:clrMapOvr>
+  <p:timing>
+    <p:tnLst>
+      <p:par>
+        <p:cTn id="1" dur="indefinite" restart="never" nodeType="tmRoot">
+          <p:childTnLst>
+            <p:seq concurrent="1" nextAc="seek">
+              <p:cTn id="2" dur="indefinite" nodeType="mainSeq">
+                <p:childTnLst>
+                  <p:par>
+                    <p:cTn id="3" fill="hold">
+                      <p:stCondLst>
+                        <p:cond delay="indefinite"/>
+                        <p:cond evt="onBegin" delay="0">
+                          <p:tn val="2"/>
+                        </p:cond>
+                      </p:stCondLst>
+                      <p:childTnLst>
+                        <p:par>
+                          <p:cTn id="4" fill="hold">
+                            <p:stCondLst>
+                              <p:cond delay="0"/>
+                            </p:stCondLst>
+                            <p:childTnLst>
+                              <p:par>
+                                <p:cTn id="5" presetID="1" presetClass="mediacall" presetSubtype="0" fill="hold" nodeType="afterEffect">
+                                  <p:stCondLst>
+                                    <p:cond delay="0"/>
+                                  </p:stCondLst>
+                                  <p:childTnLst>
+                                    <p:cmd type="call" cmd="playFrom(0.0)">
+                                      <p:cBhvr>
+                                        <p:cTn id="6" dur="13461" fill="hold"/>
+                                        <p:tgtEl>
+                                          <p:spTgt spid="7"/>
+                                        </p:tgtEl>
+                                      </p:cBhvr>
+                                    </p:cmd>
+                                  </p:childTnLst>
+                                </p:cTn>
+                              </p:par>
+                            </p:childTnLst>
+                          </p:cTn>
+                        </p:par>
+                      </p:childTnLst>
+                    </p:cTn>
+                  </p:par>
+                </p:childTnLst>
+              </p:cTn>
+              <p:prevCondLst>
+                <p:cond evt="onPrev" delay="0">
+                  <p:tgtEl>
+                    <p:sldTgt/>
+                  </p:tgtEl>
+                </p:cond>
+              </p:prevCondLst>
+              <p:nextCondLst>
+                <p:cond evt="onNext" delay="0">
+                  <p:tgtEl>
+                    <p:sldTgt/>
+                  </p:tgtEl>
+                </p:cond>
+              </p:nextCondLst>
+            </p:seq>
+            <p:video>
+              <p:cMediaNode vol="80000">
+                <p:cTn id="7" fill="hold" display="0">
+                  <p:stCondLst>
+                    <p:cond delay="indefinite"/>
+                  </p:stCondLst>
+                </p:cTn>
+                <p:tgtEl>
+                  <p:spTgt spid="7"/>
+                </p:tgtEl>
+              </p:cMediaNode>
+            </p:video>
+            <p:seq concurrent="1" nextAc="seek">
+              <p:cTn id="8" restart="whenNotActive" fill="hold" evtFilter="cancelBubble" nodeType="interactiveSeq">
+                <p:stCondLst>
+                  <p:cond evt="onClick" delay="0">
+                    <p:tgtEl>
+                      <p:spTgt spid="7"/>
+                    </p:tgtEl>
+                  </p:cond>
+                </p:stCondLst>
+                <p:endSync evt="end" delay="0">
+                  <p:rtn val="all"/>
+                </p:endSync>
+                <p:childTnLst>
+                  <p:par>
+                    <p:cTn id="9" fill="hold">
+                      <p:stCondLst>
+                        <p:cond delay="0"/>
+                      </p:stCondLst>
+                      <p:childTnLst>
+                        <p:par>
+                          <p:cTn id="10" fill="hold">
+                            <p:stCondLst>
+                              <p:cond delay="0"/>
+                            </p:stCondLst>
+                            <p:childTnLst>
+                              <p:par>
+                                <p:cTn id="11" presetID="2" presetClass="mediacall" presetSubtype="0" fill="hold" nodeType="clickEffect">
+                                  <p:stCondLst>
+                                    <p:cond delay="0"/>
+                                  </p:stCondLst>
+                                  <p:childTnLst>
+                                    <p:cmd type="call" cmd="togglePause">
+                                      <p:cBhvr>
+                                        <p:cTn id="12" dur="1" fill="hold"/>
+                                        <p:tgtEl>
+                                          <p:spTgt spid="7"/>
+                                        </p:tgtEl>
+                                      </p:cBhvr>
+                                    </p:cmd>
+                                  </p:childTnLst>
+                                </p:cTn>
+                              </p:par>
+                            </p:childTnLst>
+                          </p:cTn>
+                        </p:par>
+                      </p:childTnLst>
+                    </p:cTn>
+                  </p:par>
+                </p:childTnLst>
+              </p:cTn>
+              <p:nextCondLst>
+                <p:cond evt="onClick" delay="0">
+                  <p:tgtEl>
+                    <p:spTgt spid="7"/>
+                  </p:tgtEl>
+                </p:cond>
+              </p:nextCondLst>
+            </p:seq>
+          </p:childTnLst>
+        </p:cTn>
+      </p:par>
+    </p:tnLst>
+  </p:timing>
 </p:sld>
 </file>
 

</xml_diff>